<commit_message>
Making final additions after having Danny look at my project
</commit_message>
<xml_diff>
--- a/Analysis of Sci-Fi Movies and Availability on Streaming.pptx
+++ b/Analysis of Sci-Fi Movies and Availability on Streaming.pptx
@@ -844,7 +844,7 @@
           <a:p>
             <a:fld id="{766177EB-25AC-4598-A70B-CA063240D9FF}" type="datetimeFigureOut">
               <a:rPr lang="en-US" smtClean="0"/>
-              <a:t>3/18/2025</a:t>
+              <a:t>3/19/2025</a:t>
             </a:fld>
             <a:endParaRPr lang="en-US"/>
           </a:p>
@@ -1095,7 +1095,7 @@
           <a:p>
             <a:fld id="{766177EB-25AC-4598-A70B-CA063240D9FF}" type="datetimeFigureOut">
               <a:rPr lang="en-US" smtClean="0"/>
-              <a:t>3/18/2025</a:t>
+              <a:t>3/19/2025</a:t>
             </a:fld>
             <a:endParaRPr lang="en-US"/>
           </a:p>
@@ -1409,7 +1409,7 @@
           <a:p>
             <a:fld id="{766177EB-25AC-4598-A70B-CA063240D9FF}" type="datetimeFigureOut">
               <a:rPr lang="en-US" smtClean="0"/>
-              <a:t>3/18/2025</a:t>
+              <a:t>3/19/2025</a:t>
             </a:fld>
             <a:endParaRPr lang="en-US"/>
           </a:p>
@@ -1750,7 +1750,7 @@
           <a:p>
             <a:fld id="{766177EB-25AC-4598-A70B-CA063240D9FF}" type="datetimeFigureOut">
               <a:rPr lang="en-US" smtClean="0"/>
-              <a:t>3/18/2025</a:t>
+              <a:t>3/19/2025</a:t>
             </a:fld>
             <a:endParaRPr lang="en-US"/>
           </a:p>
@@ -2064,7 +2064,7 @@
           <a:p>
             <a:fld id="{766177EB-25AC-4598-A70B-CA063240D9FF}" type="datetimeFigureOut">
               <a:rPr lang="en-US" smtClean="0"/>
-              <a:t>3/18/2025</a:t>
+              <a:t>3/19/2025</a:t>
             </a:fld>
             <a:endParaRPr lang="en-US"/>
           </a:p>
@@ -2457,7 +2457,7 @@
           <a:p>
             <a:fld id="{766177EB-25AC-4598-A70B-CA063240D9FF}" type="datetimeFigureOut">
               <a:rPr lang="en-US" smtClean="0"/>
-              <a:t>3/18/2025</a:t>
+              <a:t>3/19/2025</a:t>
             </a:fld>
             <a:endParaRPr lang="en-US"/>
           </a:p>
@@ -2627,7 +2627,7 @@
           <a:p>
             <a:fld id="{766177EB-25AC-4598-A70B-CA063240D9FF}" type="datetimeFigureOut">
               <a:rPr lang="en-US" smtClean="0"/>
-              <a:t>3/18/2025</a:t>
+              <a:t>3/19/2025</a:t>
             </a:fld>
             <a:endParaRPr lang="en-US"/>
           </a:p>
@@ -2807,7 +2807,7 @@
           <a:p>
             <a:fld id="{766177EB-25AC-4598-A70B-CA063240D9FF}" type="datetimeFigureOut">
               <a:rPr lang="en-US" smtClean="0"/>
-              <a:t>3/18/2025</a:t>
+              <a:t>3/19/2025</a:t>
             </a:fld>
             <a:endParaRPr lang="en-US"/>
           </a:p>
@@ -2983,7 +2983,7 @@
           <a:p>
             <a:fld id="{766177EB-25AC-4598-A70B-CA063240D9FF}" type="datetimeFigureOut">
               <a:rPr lang="en-US" smtClean="0"/>
-              <a:t>3/18/2025</a:t>
+              <a:t>3/19/2025</a:t>
             </a:fld>
             <a:endParaRPr lang="en-US"/>
           </a:p>
@@ -3230,7 +3230,7 @@
           <a:p>
             <a:fld id="{766177EB-25AC-4598-A70B-CA063240D9FF}" type="datetimeFigureOut">
               <a:rPr lang="en-US" smtClean="0"/>
-              <a:t>3/18/2025</a:t>
+              <a:t>3/19/2025</a:t>
             </a:fld>
             <a:endParaRPr lang="en-US"/>
           </a:p>
@@ -3462,7 +3462,7 @@
           <a:p>
             <a:fld id="{766177EB-25AC-4598-A70B-CA063240D9FF}" type="datetimeFigureOut">
               <a:rPr lang="en-US" smtClean="0"/>
-              <a:t>3/18/2025</a:t>
+              <a:t>3/19/2025</a:t>
             </a:fld>
             <a:endParaRPr lang="en-US"/>
           </a:p>
@@ -3836,7 +3836,7 @@
           <a:p>
             <a:fld id="{766177EB-25AC-4598-A70B-CA063240D9FF}" type="datetimeFigureOut">
               <a:rPr lang="en-US" smtClean="0"/>
-              <a:t>3/18/2025</a:t>
+              <a:t>3/19/2025</a:t>
             </a:fld>
             <a:endParaRPr lang="en-US"/>
           </a:p>
@@ -3959,7 +3959,7 @@
           <a:p>
             <a:fld id="{766177EB-25AC-4598-A70B-CA063240D9FF}" type="datetimeFigureOut">
               <a:rPr lang="en-US" smtClean="0"/>
-              <a:t>3/18/2025</a:t>
+              <a:t>3/19/2025</a:t>
             </a:fld>
             <a:endParaRPr lang="en-US"/>
           </a:p>
@@ -4054,7 +4054,7 @@
           <a:p>
             <a:fld id="{766177EB-25AC-4598-A70B-CA063240D9FF}" type="datetimeFigureOut">
               <a:rPr lang="en-US" smtClean="0"/>
-              <a:t>3/18/2025</a:t>
+              <a:t>3/19/2025</a:t>
             </a:fld>
             <a:endParaRPr lang="en-US"/>
           </a:p>
@@ -4309,7 +4309,7 @@
           <a:p>
             <a:fld id="{766177EB-25AC-4598-A70B-CA063240D9FF}" type="datetimeFigureOut">
               <a:rPr lang="en-US" smtClean="0"/>
-              <a:t>3/18/2025</a:t>
+              <a:t>3/19/2025</a:t>
             </a:fld>
             <a:endParaRPr lang="en-US"/>
           </a:p>
@@ -4572,7 +4572,7 @@
           <a:p>
             <a:fld id="{766177EB-25AC-4598-A70B-CA063240D9FF}" type="datetimeFigureOut">
               <a:rPr lang="en-US" smtClean="0"/>
-              <a:t>3/18/2025</a:t>
+              <a:t>3/19/2025</a:t>
             </a:fld>
             <a:endParaRPr lang="en-US"/>
           </a:p>
@@ -5315,7 +5315,7 @@
           <a:p>
             <a:fld id="{766177EB-25AC-4598-A70B-CA063240D9FF}" type="datetimeFigureOut">
               <a:rPr lang="en-US" smtClean="0"/>
-              <a:t>3/18/2025</a:t>
+              <a:t>3/19/2025</a:t>
             </a:fld>
             <a:endParaRPr lang="en-US"/>
           </a:p>

</xml_diff>